<commit_message>
Added more info about batch updates and deletes.
</commit_message>
<xml_diff>
--- a/EF Extra Mile.pptx
+++ b/EF Extra Mile.pptx
@@ -274,7 +274,7 @@
           <a:p>
             <a:fld id="{856365B8-A905-4126-A305-28D558C34FD5}" type="datetimeFigureOut">
               <a:rPr lang="en-US" smtClean="0"/>
-              <a:t>6/2/2014</a:t>
+              <a:t>6/3/2014</a:t>
             </a:fld>
             <a:endParaRPr lang="en-US"/>
           </a:p>
@@ -444,7 +444,7 @@
           <a:p>
             <a:fld id="{856365B8-A905-4126-A305-28D558C34FD5}" type="datetimeFigureOut">
               <a:rPr lang="en-US" smtClean="0"/>
-              <a:t>6/2/2014</a:t>
+              <a:t>6/3/2014</a:t>
             </a:fld>
             <a:endParaRPr lang="en-US"/>
           </a:p>
@@ -624,7 +624,7 @@
           <a:p>
             <a:fld id="{856365B8-A905-4126-A305-28D558C34FD5}" type="datetimeFigureOut">
               <a:rPr lang="en-US" smtClean="0"/>
-              <a:t>6/2/2014</a:t>
+              <a:t>6/3/2014</a:t>
             </a:fld>
             <a:endParaRPr lang="en-US"/>
           </a:p>
@@ -794,7 +794,7 @@
           <a:p>
             <a:fld id="{856365B8-A905-4126-A305-28D558C34FD5}" type="datetimeFigureOut">
               <a:rPr lang="en-US" smtClean="0"/>
-              <a:t>6/2/2014</a:t>
+              <a:t>6/3/2014</a:t>
             </a:fld>
             <a:endParaRPr lang="en-US"/>
           </a:p>
@@ -1040,7 +1040,7 @@
           <a:p>
             <a:fld id="{856365B8-A905-4126-A305-28D558C34FD5}" type="datetimeFigureOut">
               <a:rPr lang="en-US" smtClean="0"/>
-              <a:t>6/2/2014</a:t>
+              <a:t>6/3/2014</a:t>
             </a:fld>
             <a:endParaRPr lang="en-US"/>
           </a:p>
@@ -1272,7 +1272,7 @@
           <a:p>
             <a:fld id="{856365B8-A905-4126-A305-28D558C34FD5}" type="datetimeFigureOut">
               <a:rPr lang="en-US" smtClean="0"/>
-              <a:t>6/2/2014</a:t>
+              <a:t>6/3/2014</a:t>
             </a:fld>
             <a:endParaRPr lang="en-US"/>
           </a:p>
@@ -1639,7 +1639,7 @@
           <a:p>
             <a:fld id="{856365B8-A905-4126-A305-28D558C34FD5}" type="datetimeFigureOut">
               <a:rPr lang="en-US" smtClean="0"/>
-              <a:t>6/2/2014</a:t>
+              <a:t>6/3/2014</a:t>
             </a:fld>
             <a:endParaRPr lang="en-US"/>
           </a:p>
@@ -1757,7 +1757,7 @@
           <a:p>
             <a:fld id="{856365B8-A905-4126-A305-28D558C34FD5}" type="datetimeFigureOut">
               <a:rPr lang="en-US" smtClean="0"/>
-              <a:t>6/2/2014</a:t>
+              <a:t>6/3/2014</a:t>
             </a:fld>
             <a:endParaRPr lang="en-US"/>
           </a:p>
@@ -1852,7 +1852,7 @@
           <a:p>
             <a:fld id="{856365B8-A905-4126-A305-28D558C34FD5}" type="datetimeFigureOut">
               <a:rPr lang="en-US" smtClean="0"/>
-              <a:t>6/2/2014</a:t>
+              <a:t>6/3/2014</a:t>
             </a:fld>
             <a:endParaRPr lang="en-US"/>
           </a:p>
@@ -2129,7 +2129,7 @@
           <a:p>
             <a:fld id="{856365B8-A905-4126-A305-28D558C34FD5}" type="datetimeFigureOut">
               <a:rPr lang="en-US" smtClean="0"/>
-              <a:t>6/2/2014</a:t>
+              <a:t>6/3/2014</a:t>
             </a:fld>
             <a:endParaRPr lang="en-US"/>
           </a:p>
@@ -2386,7 +2386,7 @@
           <a:p>
             <a:fld id="{856365B8-A905-4126-A305-28D558C34FD5}" type="datetimeFigureOut">
               <a:rPr lang="en-US" smtClean="0"/>
-              <a:t>6/2/2014</a:t>
+              <a:t>6/3/2014</a:t>
             </a:fld>
             <a:endParaRPr lang="en-US"/>
           </a:p>
@@ -2599,7 +2599,7 @@
           <a:p>
             <a:fld id="{856365B8-A905-4126-A305-28D558C34FD5}" type="datetimeFigureOut">
               <a:rPr lang="en-US" smtClean="0"/>
-              <a:t>6/2/2014</a:t>
+              <a:t>6/3/2014</a:t>
             </a:fld>
             <a:endParaRPr lang="en-US"/>
           </a:p>
@@ -3363,14 +3363,38 @@
           <a:p>
             <a:r>
               <a:rPr lang="en-US" dirty="0" smtClean="0"/>
-              <a:t>Batch Delete and Updates</a:t>
-            </a:r>
-          </a:p>
-          <a:p>
-            <a:r>
-              <a:rPr lang="en-US" dirty="0" smtClean="0"/>
-              <a:t>Future Queries</a:t>
-            </a:r>
+              <a:t>Batch Delete and </a:t>
+            </a:r>
+            <a:r>
+              <a:rPr lang="en-US" dirty="0" smtClean="0"/>
+              <a:t>Updates</a:t>
+            </a:r>
+          </a:p>
+          <a:p>
+            <a:pPr lvl="1"/>
+            <a:r>
+              <a:rPr lang="en-US" dirty="0" smtClean="0"/>
+              <a:t>Bypasses Interceptors, so beware if using Soft Deletes</a:t>
+            </a:r>
+            <a:endParaRPr lang="en-US" dirty="0" smtClean="0"/>
+          </a:p>
+          <a:p>
+            <a:r>
+              <a:rPr lang="en-US" dirty="0" smtClean="0"/>
+              <a:t>Future </a:t>
+            </a:r>
+            <a:r>
+              <a:rPr lang="en-US" dirty="0" smtClean="0"/>
+              <a:t>Queries</a:t>
+            </a:r>
+          </a:p>
+          <a:p>
+            <a:pPr lvl="1"/>
+            <a:r>
+              <a:rPr lang="en-US" dirty="0" smtClean="0"/>
+              <a:t>Batches multiple statements into one round trip</a:t>
+            </a:r>
+            <a:endParaRPr lang="en-US" dirty="0" smtClean="0"/>
           </a:p>
           <a:p>
             <a:r>
@@ -3561,11 +3585,7 @@
           <a:p>
             <a:r>
               <a:rPr lang="en-US" dirty="0" smtClean="0"/>
-              <a:t>Tips/Best </a:t>
-            </a:r>
-            <a:r>
-              <a:rPr lang="en-US" dirty="0" smtClean="0"/>
-              <a:t>Practices/Advice</a:t>
+              <a:t>Tips/Best Practices/Advice</a:t>
             </a:r>
           </a:p>
           <a:p>
@@ -3587,11 +3607,11 @@
   <p:clrMapOvr>
     <a:masterClrMapping/>
   </p:clrMapOvr>
-  <mc:AlternateContent xmlns:mc="http://schemas.openxmlformats.org/markup-compatibility/2006">
-    <mc:Choice xmlns:p14="http://schemas.microsoft.com/office/powerpoint/2010/main" Requires="p14">
+  <mc:AlternateContent xmlns:mc="http://schemas.openxmlformats.org/markup-compatibility/2006" xmlns:p14="http://schemas.microsoft.com/office/powerpoint/2010/main">
+    <mc:Choice Requires="p14">
       <p:transition p14:dur="10"/>
     </mc:Choice>
-    <mc:Fallback>
+    <mc:Fallback xmlns="">
       <p:transition/>
     </mc:Fallback>
   </mc:AlternateContent>
@@ -4702,6 +4722,18 @@
             <a:pPr lvl="1"/>
             <a:r>
               <a:rPr lang="en-US" dirty="0" smtClean="0"/>
+              <a:t>Added </a:t>
+            </a:r>
+            <a:r>
+              <a:rPr lang="en-US" smtClean="0"/>
+              <a:t>interceptors in 6.0</a:t>
+            </a:r>
+            <a:endParaRPr lang="en-US" dirty="0" smtClean="0"/>
+          </a:p>
+          <a:p>
+            <a:pPr lvl="1"/>
+            <a:r>
+              <a:rPr lang="en-US" dirty="0" smtClean="0"/>
               <a:t>Focused on Code-First</a:t>
             </a:r>
           </a:p>
@@ -5097,6 +5129,55 @@
                       </p:childTnLst>
                     </p:cTn>
                   </p:par>
+                  <p:par>
+                    <p:cTn id="31" fill="hold">
+                      <p:stCondLst>
+                        <p:cond delay="indefinite"/>
+                      </p:stCondLst>
+                      <p:childTnLst>
+                        <p:par>
+                          <p:cTn id="32" fill="hold">
+                            <p:stCondLst>
+                              <p:cond delay="0"/>
+                            </p:stCondLst>
+                            <p:childTnLst>
+                              <p:par>
+                                <p:cTn id="33" presetID="1" presetClass="entr" presetSubtype="0" fill="hold" nodeType="clickEffect">
+                                  <p:stCondLst>
+                                    <p:cond delay="0"/>
+                                  </p:stCondLst>
+                                  <p:childTnLst>
+                                    <p:set>
+                                      <p:cBhvr>
+                                        <p:cTn id="34" dur="1" fill="hold">
+                                          <p:stCondLst>
+                                            <p:cond delay="0"/>
+                                          </p:stCondLst>
+                                        </p:cTn>
+                                        <p:tgtEl>
+                                          <p:spTgt spid="3">
+                                            <p:txEl>
+                                              <p:pRg st="7" end="7"/>
+                                            </p:txEl>
+                                          </p:spTgt>
+                                        </p:tgtEl>
+                                        <p:attrNameLst>
+                                          <p:attrName>style.visibility</p:attrName>
+                                        </p:attrNameLst>
+                                      </p:cBhvr>
+                                      <p:to>
+                                        <p:strVal val="visible"/>
+                                      </p:to>
+                                    </p:set>
+                                  </p:childTnLst>
+                                </p:cTn>
+                              </p:par>
+                            </p:childTnLst>
+                          </p:cTn>
+                        </p:par>
+                      </p:childTnLst>
+                    </p:cTn>
+                  </p:par>
                 </p:childTnLst>
               </p:cTn>
               <p:prevCondLst>
@@ -5221,7 +5302,6 @@
               <a:rPr lang="en-US" dirty="0" smtClean="0"/>
               <a:t>Not “one size fits all”</a:t>
             </a:r>
-            <a:endParaRPr lang="en-US" dirty="0" smtClean="0"/>
           </a:p>
           <a:p>
             <a:pPr lvl="1"/>

</xml_diff>